<commit_message>
renamed bulk to range
</commit_message>
<xml_diff>
--- a/doc/repository-pattern.pptx
+++ b/doc/repository-pattern.pptx
@@ -11,11 +11,12 @@
     <p:sldId id="261" r:id="rId5"/>
     <p:sldId id="262" r:id="rId6"/>
     <p:sldId id="263" r:id="rId7"/>
-    <p:sldId id="266" r:id="rId8"/>
-    <p:sldId id="264" r:id="rId9"/>
-    <p:sldId id="265" r:id="rId10"/>
-    <p:sldId id="268" r:id="rId11"/>
-    <p:sldId id="267" r:id="rId12"/>
+    <p:sldId id="269" r:id="rId8"/>
+    <p:sldId id="266" r:id="rId9"/>
+    <p:sldId id="264" r:id="rId10"/>
+    <p:sldId id="265" r:id="rId11"/>
+    <p:sldId id="268" r:id="rId12"/>
+    <p:sldId id="267" r:id="rId13"/>
   </p:sldIdLst>
   <p:sldSz cx="12192000" cy="6858000"/>
   <p:notesSz cx="6858000" cy="9144000"/>
@@ -114,6 +115,11 @@
       </a:defRPr>
     </a:lvl9pPr>
   </p:defaultTextStyle>
+  <p:extLst>
+    <p:ext uri="{EFAFB233-063F-42B5-8137-9DF3F51BA10A}">
+      <p15:sldGuideLst xmlns:p15="http://schemas.microsoft.com/office/powerpoint/2012/main"/>
+    </p:ext>
+  </p:extLst>
 </p:presentation>
 </file>
 
@@ -840,7 +846,7 @@
             <a:fld id="{48A87A34-81AB-432B-8DAE-1953F412C126}" type="datetimeFigureOut">
               <a:rPr lang="en-US" smtClean="0"/>
               <a:pPr/>
-              <a:t>2/13/2021</a:t>
+              <a:t>2/21/2021</a:t>
             </a:fld>
             <a:endParaRPr lang="en-US" dirty="0"/>
           </a:p>
@@ -1092,7 +1098,7 @@
             <a:fld id="{48A87A34-81AB-432B-8DAE-1953F412C126}" type="datetimeFigureOut">
               <a:rPr lang="en-US" smtClean="0"/>
               <a:pPr/>
-              <a:t>2/13/2021</a:t>
+              <a:t>2/21/2021</a:t>
             </a:fld>
             <a:endParaRPr lang="en-US" dirty="0"/>
           </a:p>
@@ -1408,7 +1414,7 @@
             <a:fld id="{48A87A34-81AB-432B-8DAE-1953F412C126}" type="datetimeFigureOut">
               <a:rPr lang="en-US" smtClean="0"/>
               <a:pPr/>
-              <a:t>2/13/2021</a:t>
+              <a:t>2/21/2021</a:t>
             </a:fld>
             <a:endParaRPr lang="en-US" dirty="0"/>
           </a:p>
@@ -1751,7 +1757,7 @@
             <a:fld id="{48A87A34-81AB-432B-8DAE-1953F412C126}" type="datetimeFigureOut">
               <a:rPr lang="en-US" smtClean="0"/>
               <a:pPr/>
-              <a:t>2/13/2021</a:t>
+              <a:t>2/21/2021</a:t>
             </a:fld>
             <a:endParaRPr lang="en-US" dirty="0"/>
           </a:p>
@@ -2067,7 +2073,7 @@
             <a:fld id="{48A87A34-81AB-432B-8DAE-1953F412C126}" type="datetimeFigureOut">
               <a:rPr lang="en-US" smtClean="0"/>
               <a:pPr/>
-              <a:t>2/13/2021</a:t>
+              <a:t>2/21/2021</a:t>
             </a:fld>
             <a:endParaRPr lang="en-US" dirty="0"/>
           </a:p>
@@ -2462,7 +2468,7 @@
             <a:fld id="{48A87A34-81AB-432B-8DAE-1953F412C126}" type="datetimeFigureOut">
               <a:rPr lang="en-US" smtClean="0"/>
               <a:pPr/>
-              <a:t>2/13/2021</a:t>
+              <a:t>2/21/2021</a:t>
             </a:fld>
             <a:endParaRPr lang="en-US" dirty="0"/>
           </a:p>
@@ -2633,7 +2639,7 @@
           <a:p>
             <a:fld id="{48A87A34-81AB-432B-8DAE-1953F412C126}" type="datetimeFigureOut">
               <a:rPr lang="en-US" smtClean="0"/>
-              <a:t>2/13/2021</a:t>
+              <a:t>2/21/2021</a:t>
             </a:fld>
             <a:endParaRPr lang="en-US" dirty="0"/>
           </a:p>
@@ -2813,7 +2819,7 @@
           <a:p>
             <a:fld id="{48A87A34-81AB-432B-8DAE-1953F412C126}" type="datetimeFigureOut">
               <a:rPr lang="en-US" smtClean="0"/>
-              <a:t>2/13/2021</a:t>
+              <a:t>2/21/2021</a:t>
             </a:fld>
             <a:endParaRPr lang="en-US" dirty="0"/>
           </a:p>
@@ -2989,7 +2995,7 @@
           <a:p>
             <a:fld id="{48A87A34-81AB-432B-8DAE-1953F412C126}" type="datetimeFigureOut">
               <a:rPr lang="en-US" smtClean="0"/>
-              <a:t>2/13/2021</a:t>
+              <a:t>2/21/2021</a:t>
             </a:fld>
             <a:endParaRPr lang="en-US" dirty="0"/>
           </a:p>
@@ -3236,7 +3242,7 @@
           <a:p>
             <a:fld id="{48A87A34-81AB-432B-8DAE-1953F412C126}" type="datetimeFigureOut">
               <a:rPr lang="en-US" smtClean="0"/>
-              <a:t>2/13/2021</a:t>
+              <a:t>2/21/2021</a:t>
             </a:fld>
             <a:endParaRPr lang="en-US" dirty="0"/>
           </a:p>
@@ -3468,7 +3474,7 @@
           <a:p>
             <a:fld id="{48A87A34-81AB-432B-8DAE-1953F412C126}" type="datetimeFigureOut">
               <a:rPr lang="en-US" smtClean="0"/>
-              <a:t>2/13/2021</a:t>
+              <a:t>2/21/2021</a:t>
             </a:fld>
             <a:endParaRPr lang="en-US" dirty="0"/>
           </a:p>
@@ -3842,7 +3848,7 @@
           <a:p>
             <a:fld id="{48A87A34-81AB-432B-8DAE-1953F412C126}" type="datetimeFigureOut">
               <a:rPr lang="en-US" smtClean="0"/>
-              <a:t>2/13/2021</a:t>
+              <a:t>2/21/2021</a:t>
             </a:fld>
             <a:endParaRPr lang="en-US" dirty="0"/>
           </a:p>
@@ -3965,7 +3971,7 @@
           <a:p>
             <a:fld id="{48A87A34-81AB-432B-8DAE-1953F412C126}" type="datetimeFigureOut">
               <a:rPr lang="en-US" smtClean="0"/>
-              <a:t>2/13/2021</a:t>
+              <a:t>2/21/2021</a:t>
             </a:fld>
             <a:endParaRPr lang="en-US" dirty="0"/>
           </a:p>
@@ -4060,7 +4066,7 @@
           <a:p>
             <a:fld id="{48A87A34-81AB-432B-8DAE-1953F412C126}" type="datetimeFigureOut">
               <a:rPr lang="en-US" smtClean="0"/>
-              <a:t>2/13/2021</a:t>
+              <a:t>2/21/2021</a:t>
             </a:fld>
             <a:endParaRPr lang="en-US" dirty="0"/>
           </a:p>
@@ -4315,7 +4321,7 @@
           <a:p>
             <a:fld id="{48A87A34-81AB-432B-8DAE-1953F412C126}" type="datetimeFigureOut">
               <a:rPr lang="en-US" smtClean="0"/>
-              <a:t>2/13/2021</a:t>
+              <a:t>2/21/2021</a:t>
             </a:fld>
             <a:endParaRPr lang="en-US" dirty="0"/>
           </a:p>
@@ -4578,7 +4584,7 @@
           <a:p>
             <a:fld id="{48A87A34-81AB-432B-8DAE-1953F412C126}" type="datetimeFigureOut">
               <a:rPr lang="en-US" smtClean="0"/>
-              <a:t>2/13/2021</a:t>
+              <a:t>2/21/2021</a:t>
             </a:fld>
             <a:endParaRPr lang="en-US" dirty="0"/>
           </a:p>
@@ -5322,7 +5328,7 @@
             <a:fld id="{48A87A34-81AB-432B-8DAE-1953F412C126}" type="datetimeFigureOut">
               <a:rPr lang="en-US" smtClean="0"/>
               <a:pPr/>
-              <a:t>2/13/2021</a:t>
+              <a:t>2/21/2021</a:t>
             </a:fld>
             <a:endParaRPr lang="en-US" dirty="0"/>
           </a:p>
@@ -6775,6 +6781,152 @@
           <a:lstStyle/>
           <a:p>
             <a:r>
+              <a:rPr lang="ro-RO" dirty="0"/>
+              <a:t>Common </a:t>
+            </a:r>
+            <a:r>
+              <a:rPr lang="ro-RO" dirty="0" err="1"/>
+              <a:t>Mistakes</a:t>
+            </a:r>
+            <a:endParaRPr lang="en-GB" dirty="0"/>
+          </a:p>
+        </p:txBody>
+      </p:sp>
+      <p:sp>
+        <p:nvSpPr>
+          <p:cNvPr id="3" name="Content Placeholder 2">
+            <a:extLst>
+              <a:ext uri="{FF2B5EF4-FFF2-40B4-BE49-F238E27FC236}">
+                <a16:creationId xmlns:a16="http://schemas.microsoft.com/office/drawing/2014/main" id="{5CEC8DEC-FBF0-46F0-8C25-122B42332F5E}"/>
+              </a:ext>
+            </a:extLst>
+          </p:cNvPr>
+          <p:cNvSpPr>
+            <a:spLocks noGrp="1"/>
+          </p:cNvSpPr>
+          <p:nvPr>
+            <p:ph idx="1"/>
+          </p:nvPr>
+        </p:nvSpPr>
+        <p:spPr>
+          <a:xfrm>
+            <a:off x="677334" y="1665514"/>
+            <a:ext cx="8596668" cy="4375848"/>
+          </a:xfrm>
+        </p:spPr>
+        <p:txBody>
+          <a:bodyPr>
+            <a:normAutofit/>
+          </a:bodyPr>
+          <a:lstStyle/>
+          <a:p>
+            <a:r>
+              <a:rPr lang="en-GB" sz="2400" dirty="0"/>
+              <a:t>Repositories that return View Models</a:t>
+            </a:r>
+            <a:endParaRPr lang="ro-RO" sz="2400" dirty="0"/>
+          </a:p>
+          <a:p>
+            <a:endParaRPr lang="ro-RO" sz="2400" dirty="0"/>
+          </a:p>
+          <a:p>
+            <a:r>
+              <a:rPr lang="en-GB" sz="2400" dirty="0"/>
+              <a:t>Update method in repositories</a:t>
+            </a:r>
+            <a:endParaRPr lang="ro-RO" sz="2400" dirty="0"/>
+          </a:p>
+          <a:p>
+            <a:endParaRPr lang="ro-RO" sz="2400" dirty="0"/>
+          </a:p>
+          <a:p>
+            <a:r>
+              <a:rPr lang="en-GB" sz="2400" dirty="0"/>
+              <a:t>Save</a:t>
+            </a:r>
+            <a:r>
+              <a:rPr lang="ro-RO" sz="2400" dirty="0"/>
+              <a:t> </a:t>
+            </a:r>
+            <a:r>
+              <a:rPr lang="en-GB" sz="2400" dirty="0"/>
+              <a:t>method in repositories</a:t>
+            </a:r>
+            <a:endParaRPr lang="ro-RO" sz="2400" dirty="0"/>
+          </a:p>
+          <a:p>
+            <a:endParaRPr lang="ro-RO" sz="2400" dirty="0"/>
+          </a:p>
+          <a:p>
+            <a:r>
+              <a:rPr lang="en-GB" sz="2400" dirty="0"/>
+              <a:t>Repositories that return </a:t>
+            </a:r>
+            <a:r>
+              <a:rPr lang="en-GB" sz="2400" dirty="0" err="1"/>
+              <a:t>IQueryable</a:t>
+            </a:r>
+            <a:endParaRPr lang="en-GB" sz="2400" dirty="0"/>
+          </a:p>
+        </p:txBody>
+      </p:sp>
+    </p:spTree>
+    <p:extLst>
+      <p:ext uri="{BB962C8B-B14F-4D97-AF65-F5344CB8AC3E}">
+        <p14:creationId xmlns:p14="http://schemas.microsoft.com/office/powerpoint/2010/main" val="658367970"/>
+      </p:ext>
+    </p:extLst>
+  </p:cSld>
+  <p:clrMapOvr>
+    <a:masterClrMapping/>
+  </p:clrMapOvr>
+</p:sld>
+</file>
+
+<file path=ppt/slides/slide11.xml><?xml version="1.0" encoding="utf-8"?>
+<p:sld xmlns:a="http://schemas.openxmlformats.org/drawingml/2006/main" xmlns:r="http://schemas.openxmlformats.org/officeDocument/2006/relationships" xmlns:p="http://schemas.openxmlformats.org/presentationml/2006/main">
+  <p:cSld>
+    <p:spTree>
+      <p:nvGrpSpPr>
+        <p:cNvPr id="1" name=""/>
+        <p:cNvGrpSpPr/>
+        <p:nvPr/>
+      </p:nvGrpSpPr>
+      <p:grpSpPr>
+        <a:xfrm>
+          <a:off x="0" y="0"/>
+          <a:ext cx="0" cy="0"/>
+          <a:chOff x="0" y="0"/>
+          <a:chExt cx="0" cy="0"/>
+        </a:xfrm>
+      </p:grpSpPr>
+      <p:sp>
+        <p:nvSpPr>
+          <p:cNvPr id="2" name="Title 1">
+            <a:extLst>
+              <a:ext uri="{FF2B5EF4-FFF2-40B4-BE49-F238E27FC236}">
+                <a16:creationId xmlns:a16="http://schemas.microsoft.com/office/drawing/2014/main" id="{BBC9EB0A-6229-4E04-8F23-FAF274656ED8}"/>
+              </a:ext>
+            </a:extLst>
+          </p:cNvPr>
+          <p:cNvSpPr>
+            <a:spLocks noGrp="1"/>
+          </p:cNvSpPr>
+          <p:nvPr>
+            <p:ph type="title"/>
+          </p:nvPr>
+        </p:nvSpPr>
+        <p:spPr>
+          <a:xfrm>
+            <a:off x="677334" y="609600"/>
+            <a:ext cx="10837332" cy="1320800"/>
+          </a:xfrm>
+        </p:spPr>
+        <p:txBody>
+          <a:bodyPr/>
+          <a:lstStyle/>
+          <a:p>
+            <a:r>
               <a:rPr lang="ro-RO" dirty="0" err="1"/>
               <a:t>Conclusions</a:t>
             </a:r>
@@ -6954,7 +7106,7 @@
 </p:sld>
 </file>
 
-<file path=ppt/slides/slide11.xml><?xml version="1.0" encoding="utf-8"?>
+<file path=ppt/slides/slide12.xml><?xml version="1.0" encoding="utf-8"?>
 <p:sld xmlns:a="http://schemas.openxmlformats.org/drawingml/2006/main" xmlns:r="http://schemas.openxmlformats.org/officeDocument/2006/relationships" xmlns:p="http://schemas.openxmlformats.org/presentationml/2006/main">
   <p:cSld>
     <p:spTree>
@@ -8486,7 +8638,7 @@
           <p:cNvPr id="2" name="Title 1">
             <a:extLst>
               <a:ext uri="{FF2B5EF4-FFF2-40B4-BE49-F238E27FC236}">
-                <a16:creationId xmlns:a16="http://schemas.microsoft.com/office/drawing/2014/main" id="{BBC9EB0A-6229-4E04-8F23-FAF274656ED8}"/>
+                <a16:creationId xmlns:a16="http://schemas.microsoft.com/office/drawing/2014/main" id="{E07965C3-DE2E-427D-91C6-41FA789DB76D}"/>
               </a:ext>
             </a:extLst>
           </p:cNvPr>
@@ -8504,7 +8656,15 @@
           <a:p>
             <a:r>
               <a:rPr lang="ro-RO" dirty="0" err="1"/>
-              <a:t>Demo</a:t>
+              <a:t>Architecture</a:t>
+            </a:r>
+            <a:r>
+              <a:rPr lang="ro-RO" dirty="0"/>
+              <a:t> </a:t>
+            </a:r>
+            <a:r>
+              <a:rPr lang="ro-RO" dirty="0" err="1"/>
+              <a:t>Diagram</a:t>
             </a:r>
             <a:endParaRPr lang="en-GB" dirty="0"/>
           </a:p>
@@ -8512,17 +8672,19 @@
       </p:sp>
       <p:pic>
         <p:nvPicPr>
-          <p:cNvPr id="5" name="Picture 4">
+          <p:cNvPr id="5" name="Content Placeholder 4" descr="Graphical user interface, website&#10;&#10;Description automatically generated">
             <a:extLst>
               <a:ext uri="{FF2B5EF4-FFF2-40B4-BE49-F238E27FC236}">
-                <a16:creationId xmlns:a16="http://schemas.microsoft.com/office/drawing/2014/main" id="{AA5F376D-6478-461A-9B9B-9B576E645E90}"/>
+                <a16:creationId xmlns:a16="http://schemas.microsoft.com/office/drawing/2014/main" id="{AAA60C13-1BC5-4250-A444-29FC6E39FF50}"/>
               </a:ext>
             </a:extLst>
           </p:cNvPr>
           <p:cNvPicPr>
-            <a:picLocks noChangeAspect="1"/>
+            <a:picLocks noGrp="1" noChangeAspect="1"/>
           </p:cNvPicPr>
-          <p:nvPr/>
+          <p:nvPr>
+            <p:ph idx="1"/>
+          </p:nvPr>
         </p:nvPicPr>
         <p:blipFill>
           <a:blip r:embed="rId2"/>
@@ -8532,18 +8694,15 @@
         </p:blipFill>
         <p:spPr>
           <a:xfrm>
-            <a:off x="1786698" y="1930400"/>
-            <a:ext cx="6377940" cy="3493312"/>
+            <a:off x="1296077" y="2160588"/>
+            <a:ext cx="7359883" cy="3881437"/>
           </a:xfrm>
-          <a:prstGeom prst="rect">
-            <a:avLst/>
-          </a:prstGeom>
         </p:spPr>
       </p:pic>
     </p:spTree>
     <p:extLst>
       <p:ext uri="{BB962C8B-B14F-4D97-AF65-F5344CB8AC3E}">
-        <p14:creationId xmlns:p14="http://schemas.microsoft.com/office/powerpoint/2010/main" val="3156425336"/>
+        <p14:creationId xmlns:p14="http://schemas.microsoft.com/office/powerpoint/2010/main" val="134722911"/>
       </p:ext>
     </p:extLst>
   </p:cSld>
@@ -8570,6 +8729,36 @@
           <a:chExt cx="0" cy="0"/>
         </a:xfrm>
       </p:grpSpPr>
+      <p:pic>
+        <p:nvPicPr>
+          <p:cNvPr id="4" name="Picture 3">
+            <a:extLst>
+              <a:ext uri="{FF2B5EF4-FFF2-40B4-BE49-F238E27FC236}">
+                <a16:creationId xmlns:a16="http://schemas.microsoft.com/office/drawing/2014/main" id="{A3541DD2-B30D-4CF3-BC24-53F3CE432425}"/>
+              </a:ext>
+            </a:extLst>
+          </p:cNvPr>
+          <p:cNvPicPr>
+            <a:picLocks noChangeAspect="1"/>
+          </p:cNvPicPr>
+          <p:nvPr/>
+        </p:nvPicPr>
+        <p:blipFill>
+          <a:blip r:embed="rId2"/>
+          <a:stretch>
+            <a:fillRect/>
+          </a:stretch>
+        </p:blipFill>
+        <p:spPr>
+          <a:xfrm>
+            <a:off x="1139247" y="1682344"/>
+            <a:ext cx="6449192" cy="3493312"/>
+          </a:xfrm>
+          <a:prstGeom prst="rect">
+            <a:avLst/>
+          </a:prstGeom>
+        </p:spPr>
+      </p:pic>
       <p:sp>
         <p:nvSpPr>
           <p:cNvPr id="2" name="Title 1">
@@ -8586,122 +8775,53 @@
             <p:ph type="title"/>
           </p:nvPr>
         </p:nvSpPr>
-        <p:spPr>
-          <a:xfrm>
-            <a:off x="677334" y="609600"/>
-            <a:ext cx="10837332" cy="1320800"/>
-          </a:xfrm>
-        </p:spPr>
+        <p:spPr/>
         <p:txBody>
           <a:bodyPr/>
           <a:lstStyle/>
           <a:p>
             <a:r>
-              <a:rPr lang="en-GB" dirty="0"/>
-              <a:t>Entity Framework vs Custom Repositories</a:t>
-            </a:r>
-          </a:p>
-        </p:txBody>
-      </p:sp>
-      <p:sp>
-        <p:nvSpPr>
-          <p:cNvPr id="3" name="Content Placeholder 2">
+              <a:rPr lang="ro-RO" dirty="0" err="1"/>
+              <a:t>Demo</a:t>
+            </a:r>
+            <a:endParaRPr lang="en-GB" dirty="0"/>
+          </a:p>
+        </p:txBody>
+      </p:sp>
+      <p:pic>
+        <p:nvPicPr>
+          <p:cNvPr id="5" name="Picture 4">
             <a:extLst>
               <a:ext uri="{FF2B5EF4-FFF2-40B4-BE49-F238E27FC236}">
-                <a16:creationId xmlns:a16="http://schemas.microsoft.com/office/drawing/2014/main" id="{5CEC8DEC-FBF0-46F0-8C25-122B42332F5E}"/>
+                <a16:creationId xmlns:a16="http://schemas.microsoft.com/office/drawing/2014/main" id="{AA5F376D-6478-461A-9B9B-9B576E645E90}"/>
               </a:ext>
             </a:extLst>
           </p:cNvPr>
-          <p:cNvSpPr>
-            <a:spLocks noGrp="1"/>
-          </p:cNvSpPr>
-          <p:nvPr>
-            <p:ph idx="1"/>
-          </p:nvPr>
-        </p:nvSpPr>
+          <p:cNvPicPr>
+            <a:picLocks noChangeAspect="1"/>
+          </p:cNvPicPr>
+          <p:nvPr/>
+        </p:nvPicPr>
+        <p:blipFill>
+          <a:blip r:embed="rId3"/>
+          <a:stretch>
+            <a:fillRect/>
+          </a:stretch>
+        </p:blipFill>
         <p:spPr>
           <a:xfrm>
-            <a:off x="677334" y="1665514"/>
-            <a:ext cx="8596668" cy="4375848"/>
+            <a:off x="2719952" y="2621700"/>
+            <a:ext cx="6377940" cy="3493312"/>
           </a:xfrm>
+          <a:prstGeom prst="rect">
+            <a:avLst/>
+          </a:prstGeom>
         </p:spPr>
-        <p:txBody>
-          <a:bodyPr>
-            <a:normAutofit/>
-          </a:bodyPr>
-          <a:lstStyle/>
-          <a:p>
-            <a:r>
-              <a:rPr lang="en-GB" dirty="0" err="1"/>
-              <a:t>DbSet</a:t>
-            </a:r>
-            <a:r>
-              <a:rPr lang="en-GB" dirty="0"/>
-              <a:t>&lt;T&gt; is a Repository</a:t>
-            </a:r>
-          </a:p>
-          <a:p>
-            <a:pPr lvl="1"/>
-            <a:r>
-              <a:rPr lang="en-GB" dirty="0"/>
-              <a:t>(+) Hides the details of accessing the data</a:t>
-            </a:r>
-          </a:p>
-          <a:p>
-            <a:pPr lvl="1"/>
-            <a:r>
-              <a:rPr lang="en-GB" dirty="0"/>
-              <a:t>(+) Emulates an in-memory collection</a:t>
-            </a:r>
-          </a:p>
-          <a:p>
-            <a:pPr lvl="1"/>
-            <a:r>
-              <a:rPr lang="en-GB" dirty="0"/>
-              <a:t>(-) We have no place where to write custom queries that can be later used in multiple places in the rest of the application.</a:t>
-            </a:r>
-          </a:p>
-          <a:p>
-            <a:endParaRPr lang="en-GB" dirty="0"/>
-          </a:p>
-          <a:p>
-            <a:r>
-              <a:rPr lang="en-GB" dirty="0" err="1"/>
-              <a:t>DbContext</a:t>
-            </a:r>
-            <a:r>
-              <a:rPr lang="en-GB" dirty="0"/>
-              <a:t> is a Unit of Work</a:t>
-            </a:r>
-          </a:p>
-          <a:p>
-            <a:pPr lvl="1"/>
-            <a:r>
-              <a:rPr lang="en-GB" dirty="0"/>
-              <a:t>(+) Ensures data consistency</a:t>
-            </a:r>
-          </a:p>
-          <a:p>
-            <a:pPr lvl="2"/>
-            <a:r>
-              <a:rPr lang="en-GB" dirty="0"/>
-              <a:t>It provides the `</a:t>
-            </a:r>
-            <a:r>
-              <a:rPr lang="en-GB" dirty="0" err="1"/>
-              <a:t>SaveChanges</a:t>
-            </a:r>
-            <a:r>
-              <a:rPr lang="en-GB" dirty="0"/>
-              <a:t>` method.</a:t>
-            </a:r>
-          </a:p>
-        </p:txBody>
-      </p:sp>
+      </p:pic>
     </p:spTree>
     <p:extLst>
       <p:ext uri="{BB962C8B-B14F-4D97-AF65-F5344CB8AC3E}">
-        <p14:creationId xmlns:p14="http://schemas.microsoft.com/office/powerpoint/2010/main" val="3306418173"/>
+        <p14:creationId xmlns:p14="http://schemas.microsoft.com/office/powerpoint/2010/main" val="3156425336"/>
       </p:ext>
     </p:extLst>
   </p:cSld>
@@ -8755,14 +8875,9 @@
           <a:lstStyle/>
           <a:p>
             <a:r>
-              <a:rPr lang="ro-RO" dirty="0"/>
-              <a:t>Common </a:t>
-            </a:r>
-            <a:r>
-              <a:rPr lang="ro-RO" dirty="0" err="1"/>
-              <a:t>Mistakes</a:t>
-            </a:r>
-            <a:endParaRPr lang="en-GB" dirty="0"/>
+              <a:rPr lang="en-GB" dirty="0"/>
+              <a:t>Entity Framework vs Custom Repositories</a:t>
+            </a:r>
           </a:p>
         </p:txBody>
       </p:sp>
@@ -8795,59 +8910,76 @@
           <a:lstStyle/>
           <a:p>
             <a:r>
-              <a:rPr lang="en-GB" sz="2400" dirty="0"/>
-              <a:t>Repositories that return View Models</a:t>
-            </a:r>
-            <a:endParaRPr lang="ro-RO" sz="2400" dirty="0"/>
-          </a:p>
-          <a:p>
-            <a:endParaRPr lang="ro-RO" sz="2400" dirty="0"/>
-          </a:p>
-          <a:p>
-            <a:r>
-              <a:rPr lang="en-GB" sz="2400" dirty="0"/>
-              <a:t>Update method in repositories</a:t>
-            </a:r>
-            <a:endParaRPr lang="ro-RO" sz="2400" dirty="0"/>
-          </a:p>
-          <a:p>
-            <a:endParaRPr lang="ro-RO" sz="2400" dirty="0"/>
-          </a:p>
-          <a:p>
-            <a:r>
-              <a:rPr lang="en-GB" sz="2400" dirty="0"/>
-              <a:t>Save</a:t>
-            </a:r>
-            <a:r>
-              <a:rPr lang="ro-RO" sz="2400" dirty="0"/>
-              <a:t> </a:t>
-            </a:r>
-            <a:r>
-              <a:rPr lang="en-GB" sz="2400" dirty="0"/>
-              <a:t>method in repositories</a:t>
-            </a:r>
-            <a:endParaRPr lang="ro-RO" sz="2400" dirty="0"/>
-          </a:p>
-          <a:p>
-            <a:endParaRPr lang="ro-RO" sz="2400" dirty="0"/>
-          </a:p>
-          <a:p>
-            <a:r>
-              <a:rPr lang="en-GB" sz="2400" dirty="0"/>
-              <a:t>Repositories that return </a:t>
-            </a:r>
-            <a:r>
-              <a:rPr lang="en-GB" sz="2400" dirty="0" err="1"/>
-              <a:t>IQueryable</a:t>
-            </a:r>
-            <a:endParaRPr lang="en-GB" sz="2400" dirty="0"/>
+              <a:rPr lang="en-GB" dirty="0" err="1"/>
+              <a:t>DbSet</a:t>
+            </a:r>
+            <a:r>
+              <a:rPr lang="en-GB" dirty="0"/>
+              <a:t>&lt;T&gt; is a Repository</a:t>
+            </a:r>
+          </a:p>
+          <a:p>
+            <a:pPr lvl="1"/>
+            <a:r>
+              <a:rPr lang="en-GB" dirty="0"/>
+              <a:t>(+) Hides the details of accessing the data</a:t>
+            </a:r>
+          </a:p>
+          <a:p>
+            <a:pPr lvl="1"/>
+            <a:r>
+              <a:rPr lang="en-GB" dirty="0"/>
+              <a:t>(+) Emulates an in-memory collection</a:t>
+            </a:r>
+          </a:p>
+          <a:p>
+            <a:pPr lvl="1"/>
+            <a:r>
+              <a:rPr lang="en-GB" dirty="0"/>
+              <a:t>(-) We have no place where to write custom queries that can be later used in multiple places in the rest of the application.</a:t>
+            </a:r>
+          </a:p>
+          <a:p>
+            <a:endParaRPr lang="en-GB" dirty="0"/>
+          </a:p>
+          <a:p>
+            <a:r>
+              <a:rPr lang="en-GB" dirty="0" err="1"/>
+              <a:t>DbContext</a:t>
+            </a:r>
+            <a:r>
+              <a:rPr lang="en-GB" dirty="0"/>
+              <a:t> is a Unit of Work</a:t>
+            </a:r>
+          </a:p>
+          <a:p>
+            <a:pPr lvl="1"/>
+            <a:r>
+              <a:rPr lang="en-GB" dirty="0"/>
+              <a:t>(+) Ensures data consistency</a:t>
+            </a:r>
+          </a:p>
+          <a:p>
+            <a:pPr lvl="2"/>
+            <a:r>
+              <a:rPr lang="en-GB" dirty="0"/>
+              <a:t>It provides the `</a:t>
+            </a:r>
+            <a:r>
+              <a:rPr lang="en-GB" dirty="0" err="1"/>
+              <a:t>SaveChanges</a:t>
+            </a:r>
+            <a:r>
+              <a:rPr lang="en-GB" dirty="0"/>
+              <a:t>` method.</a:t>
+            </a:r>
           </a:p>
         </p:txBody>
       </p:sp>
     </p:spTree>
     <p:extLst>
       <p:ext uri="{BB962C8B-B14F-4D97-AF65-F5344CB8AC3E}">
-        <p14:creationId xmlns:p14="http://schemas.microsoft.com/office/powerpoint/2010/main" val="658367970"/>
+        <p14:creationId xmlns:p14="http://schemas.microsoft.com/office/powerpoint/2010/main" val="3306418173"/>
       </p:ext>
     </p:extLst>
   </p:cSld>

</xml_diff>

<commit_message>
updated presentation and other documents
</commit_message>
<xml_diff>
--- a/doc/repository-pattern.pptx
+++ b/doc/repository-pattern.pptx
@@ -16,7 +16,8 @@
     <p:sldId id="264" r:id="rId10"/>
     <p:sldId id="265" r:id="rId11"/>
     <p:sldId id="268" r:id="rId12"/>
-    <p:sldId id="267" r:id="rId13"/>
+    <p:sldId id="270" r:id="rId13"/>
+    <p:sldId id="267" r:id="rId14"/>
   </p:sldIdLst>
   <p:sldSz cx="12192000" cy="6858000"/>
   <p:notesSz cx="6858000" cy="9144000"/>
@@ -846,7 +847,7 @@
             <a:fld id="{48A87A34-81AB-432B-8DAE-1953F412C126}" type="datetimeFigureOut">
               <a:rPr lang="en-US" smtClean="0"/>
               <a:pPr/>
-              <a:t>2/21/2021</a:t>
+              <a:t>2/22/2021</a:t>
             </a:fld>
             <a:endParaRPr lang="en-US" dirty="0"/>
           </a:p>
@@ -1098,7 +1099,7 @@
             <a:fld id="{48A87A34-81AB-432B-8DAE-1953F412C126}" type="datetimeFigureOut">
               <a:rPr lang="en-US" smtClean="0"/>
               <a:pPr/>
-              <a:t>2/21/2021</a:t>
+              <a:t>2/22/2021</a:t>
             </a:fld>
             <a:endParaRPr lang="en-US" dirty="0"/>
           </a:p>
@@ -1414,7 +1415,7 @@
             <a:fld id="{48A87A34-81AB-432B-8DAE-1953F412C126}" type="datetimeFigureOut">
               <a:rPr lang="en-US" smtClean="0"/>
               <a:pPr/>
-              <a:t>2/21/2021</a:t>
+              <a:t>2/22/2021</a:t>
             </a:fld>
             <a:endParaRPr lang="en-US" dirty="0"/>
           </a:p>
@@ -1757,7 +1758,7 @@
             <a:fld id="{48A87A34-81AB-432B-8DAE-1953F412C126}" type="datetimeFigureOut">
               <a:rPr lang="en-US" smtClean="0"/>
               <a:pPr/>
-              <a:t>2/21/2021</a:t>
+              <a:t>2/22/2021</a:t>
             </a:fld>
             <a:endParaRPr lang="en-US" dirty="0"/>
           </a:p>
@@ -2073,7 +2074,7 @@
             <a:fld id="{48A87A34-81AB-432B-8DAE-1953F412C126}" type="datetimeFigureOut">
               <a:rPr lang="en-US" smtClean="0"/>
               <a:pPr/>
-              <a:t>2/21/2021</a:t>
+              <a:t>2/22/2021</a:t>
             </a:fld>
             <a:endParaRPr lang="en-US" dirty="0"/>
           </a:p>
@@ -2468,7 +2469,7 @@
             <a:fld id="{48A87A34-81AB-432B-8DAE-1953F412C126}" type="datetimeFigureOut">
               <a:rPr lang="en-US" smtClean="0"/>
               <a:pPr/>
-              <a:t>2/21/2021</a:t>
+              <a:t>2/22/2021</a:t>
             </a:fld>
             <a:endParaRPr lang="en-US" dirty="0"/>
           </a:p>
@@ -2639,7 +2640,7 @@
           <a:p>
             <a:fld id="{48A87A34-81AB-432B-8DAE-1953F412C126}" type="datetimeFigureOut">
               <a:rPr lang="en-US" smtClean="0"/>
-              <a:t>2/21/2021</a:t>
+              <a:t>2/22/2021</a:t>
             </a:fld>
             <a:endParaRPr lang="en-US" dirty="0"/>
           </a:p>
@@ -2819,7 +2820,7 @@
           <a:p>
             <a:fld id="{48A87A34-81AB-432B-8DAE-1953F412C126}" type="datetimeFigureOut">
               <a:rPr lang="en-US" smtClean="0"/>
-              <a:t>2/21/2021</a:t>
+              <a:t>2/22/2021</a:t>
             </a:fld>
             <a:endParaRPr lang="en-US" dirty="0"/>
           </a:p>
@@ -2995,7 +2996,7 @@
           <a:p>
             <a:fld id="{48A87A34-81AB-432B-8DAE-1953F412C126}" type="datetimeFigureOut">
               <a:rPr lang="en-US" smtClean="0"/>
-              <a:t>2/21/2021</a:t>
+              <a:t>2/22/2021</a:t>
             </a:fld>
             <a:endParaRPr lang="en-US" dirty="0"/>
           </a:p>
@@ -3242,7 +3243,7 @@
           <a:p>
             <a:fld id="{48A87A34-81AB-432B-8DAE-1953F412C126}" type="datetimeFigureOut">
               <a:rPr lang="en-US" smtClean="0"/>
-              <a:t>2/21/2021</a:t>
+              <a:t>2/22/2021</a:t>
             </a:fld>
             <a:endParaRPr lang="en-US" dirty="0"/>
           </a:p>
@@ -3474,7 +3475,7 @@
           <a:p>
             <a:fld id="{48A87A34-81AB-432B-8DAE-1953F412C126}" type="datetimeFigureOut">
               <a:rPr lang="en-US" smtClean="0"/>
-              <a:t>2/21/2021</a:t>
+              <a:t>2/22/2021</a:t>
             </a:fld>
             <a:endParaRPr lang="en-US" dirty="0"/>
           </a:p>
@@ -3848,7 +3849,7 @@
           <a:p>
             <a:fld id="{48A87A34-81AB-432B-8DAE-1953F412C126}" type="datetimeFigureOut">
               <a:rPr lang="en-US" smtClean="0"/>
-              <a:t>2/21/2021</a:t>
+              <a:t>2/22/2021</a:t>
             </a:fld>
             <a:endParaRPr lang="en-US" dirty="0"/>
           </a:p>
@@ -3971,7 +3972,7 @@
           <a:p>
             <a:fld id="{48A87A34-81AB-432B-8DAE-1953F412C126}" type="datetimeFigureOut">
               <a:rPr lang="en-US" smtClean="0"/>
-              <a:t>2/21/2021</a:t>
+              <a:t>2/22/2021</a:t>
             </a:fld>
             <a:endParaRPr lang="en-US" dirty="0"/>
           </a:p>
@@ -4066,7 +4067,7 @@
           <a:p>
             <a:fld id="{48A87A34-81AB-432B-8DAE-1953F412C126}" type="datetimeFigureOut">
               <a:rPr lang="en-US" smtClean="0"/>
-              <a:t>2/21/2021</a:t>
+              <a:t>2/22/2021</a:t>
             </a:fld>
             <a:endParaRPr lang="en-US" dirty="0"/>
           </a:p>
@@ -4321,7 +4322,7 @@
           <a:p>
             <a:fld id="{48A87A34-81AB-432B-8DAE-1953F412C126}" type="datetimeFigureOut">
               <a:rPr lang="en-US" smtClean="0"/>
-              <a:t>2/21/2021</a:t>
+              <a:t>2/22/2021</a:t>
             </a:fld>
             <a:endParaRPr lang="en-US" dirty="0"/>
           </a:p>
@@ -4584,7 +4585,7 @@
           <a:p>
             <a:fld id="{48A87A34-81AB-432B-8DAE-1953F412C126}" type="datetimeFigureOut">
               <a:rPr lang="en-US" smtClean="0"/>
-              <a:t>2/21/2021</a:t>
+              <a:t>2/22/2021</a:t>
             </a:fld>
             <a:endParaRPr lang="en-US" dirty="0"/>
           </a:p>
@@ -5328,7 +5329,7 @@
             <a:fld id="{48A87A34-81AB-432B-8DAE-1953F412C126}" type="datetimeFigureOut">
               <a:rPr lang="en-US" smtClean="0"/>
               <a:pPr/>
-              <a:t>2/21/2021</a:t>
+              <a:t>2/22/2021</a:t>
             </a:fld>
             <a:endParaRPr lang="en-US" dirty="0"/>
           </a:p>
@@ -6621,7 +6622,7 @@
           <a:lstStyle/>
           <a:p>
             <a:pPr algn="l"/>
-            <a:endParaRPr lang="en-GB" sz="2000">
+            <a:endParaRPr lang="en-GB" sz="2000" dirty="0">
               <a:solidFill>
                 <a:srgbClr val="FFFFFF">
                   <a:alpha val="70000"/>
@@ -6822,7 +6823,27 @@
           <a:p>
             <a:r>
               <a:rPr lang="en-GB" sz="2400" dirty="0"/>
-              <a:t>Repositories that return View Models</a:t>
+              <a:t>Repositories that </a:t>
+            </a:r>
+            <a:r>
+              <a:rPr lang="ro-RO" sz="2400" dirty="0" err="1"/>
+              <a:t>store</a:t>
+            </a:r>
+            <a:r>
+              <a:rPr lang="ro-RO" sz="2400" dirty="0"/>
+              <a:t> </a:t>
+            </a:r>
+            <a:r>
+              <a:rPr lang="ro-RO" sz="2400" dirty="0" err="1"/>
+              <a:t>and</a:t>
+            </a:r>
+            <a:r>
+              <a:rPr lang="ro-RO" sz="2400" dirty="0"/>
+              <a:t> </a:t>
+            </a:r>
+            <a:r>
+              <a:rPr lang="en-GB" sz="2400" dirty="0"/>
+              <a:t>return View Models</a:t>
             </a:r>
             <a:endParaRPr lang="ro-RO" sz="2400" dirty="0"/>
           </a:p>
@@ -6832,7 +6853,15 @@
           <a:p>
             <a:r>
               <a:rPr lang="en-GB" sz="2400" dirty="0"/>
-              <a:t>Update method in repositories</a:t>
+              <a:t>Update</a:t>
+            </a:r>
+            <a:r>
+              <a:rPr lang="ro-RO" sz="2400" dirty="0"/>
+              <a:t>()</a:t>
+            </a:r>
+            <a:r>
+              <a:rPr lang="en-GB" sz="2400" dirty="0"/>
+              <a:t> method in repositories</a:t>
             </a:r>
             <a:endParaRPr lang="ro-RO" sz="2400" dirty="0"/>
           </a:p>
@@ -6846,7 +6875,7 @@
             </a:r>
             <a:r>
               <a:rPr lang="ro-RO" sz="2400" dirty="0"/>
-              <a:t> </a:t>
+              <a:t>() </a:t>
             </a:r>
             <a:r>
               <a:rPr lang="en-GB" sz="2400" dirty="0"/>
@@ -6972,7 +7001,7 @@
             <a:pPr lvl="1"/>
             <a:r>
               <a:rPr lang="ro-RO" sz="2200" dirty="0"/>
-              <a:t>in-</a:t>
+              <a:t>In-</a:t>
             </a:r>
             <a:r>
               <a:rPr lang="ro-RO" sz="2200" dirty="0" err="1"/>
@@ -7128,6 +7157,187 @@
           <p:cNvPr id="2" name="Title 1">
             <a:extLst>
               <a:ext uri="{FF2B5EF4-FFF2-40B4-BE49-F238E27FC236}">
+                <a16:creationId xmlns:a16="http://schemas.microsoft.com/office/drawing/2014/main" id="{874E9338-FE30-4734-B870-EEE7FC27E0DF}"/>
+              </a:ext>
+            </a:extLst>
+          </p:cNvPr>
+          <p:cNvSpPr>
+            <a:spLocks noGrp="1"/>
+          </p:cNvSpPr>
+          <p:nvPr>
+            <p:ph type="title"/>
+          </p:nvPr>
+        </p:nvSpPr>
+        <p:spPr/>
+        <p:txBody>
+          <a:bodyPr/>
+          <a:lstStyle/>
+          <a:p>
+            <a:r>
+              <a:rPr lang="ro-RO" dirty="0" err="1"/>
+              <a:t>Useful</a:t>
+            </a:r>
+            <a:r>
+              <a:rPr lang="ro-RO" dirty="0"/>
+              <a:t> </a:t>
+            </a:r>
+            <a:r>
+              <a:rPr lang="ro-RO" dirty="0" err="1"/>
+              <a:t>Links</a:t>
+            </a:r>
+            <a:endParaRPr lang="en-GB" dirty="0"/>
+          </a:p>
+        </p:txBody>
+      </p:sp>
+      <p:sp>
+        <p:nvSpPr>
+          <p:cNvPr id="3" name="Content Placeholder 2">
+            <a:extLst>
+              <a:ext uri="{FF2B5EF4-FFF2-40B4-BE49-F238E27FC236}">
+                <a16:creationId xmlns:a16="http://schemas.microsoft.com/office/drawing/2014/main" id="{77F7A52E-6A90-450E-818A-EA14EFC86B68}"/>
+              </a:ext>
+            </a:extLst>
+          </p:cNvPr>
+          <p:cNvSpPr>
+            <a:spLocks noGrp="1"/>
+          </p:cNvSpPr>
+          <p:nvPr>
+            <p:ph idx="1"/>
+          </p:nvPr>
+        </p:nvSpPr>
+        <p:spPr/>
+        <p:txBody>
+          <a:bodyPr/>
+          <a:lstStyle/>
+          <a:p>
+            <a:r>
+              <a:rPr lang="ro-RO" dirty="0" err="1"/>
+              <a:t>Good</a:t>
+            </a:r>
+            <a:r>
+              <a:rPr lang="ro-RO" dirty="0"/>
+              <a:t> </a:t>
+            </a:r>
+            <a:r>
+              <a:rPr lang="ro-RO" dirty="0" err="1"/>
+              <a:t>presentation</a:t>
+            </a:r>
+            <a:r>
+              <a:rPr lang="ro-RO" dirty="0"/>
+              <a:t> of </a:t>
+            </a:r>
+            <a:r>
+              <a:rPr lang="ro-RO" dirty="0" err="1"/>
+              <a:t>Repository</a:t>
+            </a:r>
+            <a:r>
+              <a:rPr lang="ro-RO" dirty="0"/>
+              <a:t> Pattern (30 min) </a:t>
+            </a:r>
+            <a:r>
+              <a:rPr lang="ro-RO" dirty="0" err="1"/>
+              <a:t>by</a:t>
+            </a:r>
+            <a:r>
+              <a:rPr lang="ro-RO" dirty="0"/>
+              <a:t> </a:t>
+            </a:r>
+            <a:r>
+              <a:rPr lang="ro-RO" dirty="0" err="1"/>
+              <a:t>Mosh</a:t>
+            </a:r>
+            <a:r>
+              <a:rPr lang="ro-RO" dirty="0"/>
+              <a:t> </a:t>
+            </a:r>
+            <a:r>
+              <a:rPr lang="ro-RO" dirty="0" err="1"/>
+              <a:t>Hamedani</a:t>
+            </a:r>
+            <a:endParaRPr lang="ro-RO" dirty="0"/>
+          </a:p>
+          <a:p>
+            <a:pPr lvl="1"/>
+            <a:r>
+              <a:rPr lang="en-GB" dirty="0">
+                <a:hlinkClick r:id="rId2"/>
+              </a:rPr>
+              <a:t>https://www.youtube.com/watch?v=rtXpYpZdOzM&amp;feature=youtu.be</a:t>
+            </a:r>
+            <a:endParaRPr lang="ro-RO" dirty="0"/>
+          </a:p>
+          <a:p>
+            <a:endParaRPr lang="ro-RO" dirty="0"/>
+          </a:p>
+          <a:p>
+            <a:r>
+              <a:rPr lang="ro-RO" dirty="0"/>
+              <a:t>The Shop </a:t>
+            </a:r>
+            <a:r>
+              <a:rPr lang="ro-RO" dirty="0" err="1"/>
+              <a:t>Application</a:t>
+            </a:r>
+            <a:r>
+              <a:rPr lang="ro-RO" dirty="0"/>
+              <a:t> – </a:t>
+            </a:r>
+            <a:r>
+              <a:rPr lang="ro-RO" dirty="0" err="1"/>
+              <a:t>GitHub</a:t>
+            </a:r>
+            <a:endParaRPr lang="ro-RO" dirty="0"/>
+          </a:p>
+          <a:p>
+            <a:pPr lvl="1"/>
+            <a:r>
+              <a:rPr lang="en-GB" dirty="0">
+                <a:hlinkClick r:id="rId3"/>
+              </a:rPr>
+              <a:t>https://github.com/lastunicorn/Shop</a:t>
+            </a:r>
+            <a:endParaRPr lang="ro-RO" dirty="0"/>
+          </a:p>
+          <a:p>
+            <a:endParaRPr lang="ro-RO" dirty="0"/>
+          </a:p>
+        </p:txBody>
+      </p:sp>
+    </p:spTree>
+    <p:extLst>
+      <p:ext uri="{BB962C8B-B14F-4D97-AF65-F5344CB8AC3E}">
+        <p14:creationId xmlns:p14="http://schemas.microsoft.com/office/powerpoint/2010/main" val="135785843"/>
+      </p:ext>
+    </p:extLst>
+  </p:cSld>
+  <p:clrMapOvr>
+    <a:masterClrMapping/>
+  </p:clrMapOvr>
+</p:sld>
+</file>
+
+<file path=ppt/slides/slide13.xml><?xml version="1.0" encoding="utf-8"?>
+<p:sld xmlns:a="http://schemas.openxmlformats.org/drawingml/2006/main" xmlns:r="http://schemas.openxmlformats.org/officeDocument/2006/relationships" xmlns:p="http://schemas.openxmlformats.org/presentationml/2006/main">
+  <p:cSld>
+    <p:spTree>
+      <p:nvGrpSpPr>
+        <p:cNvPr id="1" name=""/>
+        <p:cNvGrpSpPr/>
+        <p:nvPr/>
+      </p:nvGrpSpPr>
+      <p:grpSpPr>
+        <a:xfrm>
+          <a:off x="0" y="0"/>
+          <a:ext cx="0" cy="0"/>
+          <a:chOff x="0" y="0"/>
+          <a:chExt cx="0" cy="0"/>
+        </a:xfrm>
+      </p:grpSpPr>
+      <p:sp>
+        <p:nvSpPr>
+          <p:cNvPr id="2" name="Title 1">
+            <a:extLst>
+              <a:ext uri="{FF2B5EF4-FFF2-40B4-BE49-F238E27FC236}">
                 <a16:creationId xmlns:a16="http://schemas.microsoft.com/office/drawing/2014/main" id="{633C1D63-27D5-4D7A-9A8C-1E6C6A6280B5}"/>
               </a:ext>
             </a:extLst>
@@ -7172,7 +7382,7 @@
             </a:r>
             <a:r>
               <a:rPr lang="ro-RO" dirty="0" err="1"/>
-              <a:t>You</a:t>
+              <a:t>you</a:t>
             </a:r>
             <a:endParaRPr lang="en-GB" dirty="0"/>
           </a:p>
@@ -7392,7 +7602,7 @@
             </a:r>
           </a:p>
           <a:p>
-            <a:pPr marL="0" indent="0">
+            <a:pPr marL="0" indent="0" algn="r">
               <a:buNone/>
             </a:pPr>
             <a:r>
@@ -7458,136 +7668,6 @@
           </a:prstGeom>
         </p:spPr>
       </p:pic>
-      <p:sp>
-        <p:nvSpPr>
-          <p:cNvPr id="8" name="TextBox 7">
-            <a:extLst>
-              <a:ext uri="{FF2B5EF4-FFF2-40B4-BE49-F238E27FC236}">
-                <a16:creationId xmlns:a16="http://schemas.microsoft.com/office/drawing/2014/main" id="{A99015B0-DC38-4213-AE42-442B66C9910A}"/>
-              </a:ext>
-            </a:extLst>
-          </p:cNvPr>
-          <p:cNvSpPr txBox="1"/>
-          <p:nvPr/>
-        </p:nvSpPr>
-        <p:spPr>
-          <a:xfrm>
-            <a:off x="6024394" y="3284464"/>
-            <a:ext cx="3249608" cy="369332"/>
-          </a:xfrm>
-          <a:prstGeom prst="rect">
-            <a:avLst/>
-          </a:prstGeom>
-          <a:noFill/>
-        </p:spPr>
-        <p:txBody>
-          <a:bodyPr wrap="none" rtlCol="0">
-            <a:spAutoFit/>
-          </a:bodyPr>
-          <a:lstStyle/>
-          <a:p>
-            <a:pPr algn="r"/>
-            <a:r>
-              <a:rPr lang="ro-RO" sz="1800" b="0" i="0" dirty="0">
-                <a:solidFill>
-                  <a:schemeClr val="tx2">
-                    <a:lumMod val="60000"/>
-                    <a:lumOff val="40000"/>
-                  </a:schemeClr>
-                </a:solidFill>
-                <a:effectLst/>
-                <a:latin typeface="Trebuchet MS" panose="020B0603020202020204" pitchFamily="34" charset="0"/>
-              </a:rPr>
-              <a:t>[ </a:t>
-            </a:r>
-            <a:r>
-              <a:rPr lang="ro-RO" sz="1800" b="0" i="0" dirty="0" err="1">
-                <a:solidFill>
-                  <a:schemeClr val="tx2">
-                    <a:lumMod val="60000"/>
-                    <a:lumOff val="40000"/>
-                  </a:schemeClr>
-                </a:solidFill>
-                <a:effectLst/>
-                <a:latin typeface="Trebuchet MS" panose="020B0603020202020204" pitchFamily="34" charset="0"/>
-              </a:rPr>
-              <a:t>Entity</a:t>
-            </a:r>
-            <a:r>
-              <a:rPr lang="ro-RO" sz="1800" b="0" i="0" dirty="0">
-                <a:solidFill>
-                  <a:schemeClr val="tx2">
-                    <a:lumMod val="60000"/>
-                    <a:lumOff val="40000"/>
-                  </a:schemeClr>
-                </a:solidFill>
-                <a:effectLst/>
-                <a:latin typeface="Trebuchet MS" panose="020B0603020202020204" pitchFamily="34" charset="0"/>
-              </a:rPr>
-              <a:t> Framework </a:t>
-            </a:r>
-            <a:r>
-              <a:rPr lang="ro-RO" sz="1800" b="0" i="0" dirty="0" err="1">
-                <a:solidFill>
-                  <a:schemeClr val="tx2">
-                    <a:lumMod val="60000"/>
-                    <a:lumOff val="40000"/>
-                  </a:schemeClr>
-                </a:solidFill>
-                <a:effectLst/>
-                <a:latin typeface="Trebuchet MS" panose="020B0603020202020204" pitchFamily="34" charset="0"/>
-              </a:rPr>
-              <a:t>is</a:t>
-            </a:r>
-            <a:r>
-              <a:rPr lang="ro-RO" sz="1800" b="0" i="0" dirty="0">
-                <a:solidFill>
-                  <a:schemeClr val="tx2">
-                    <a:lumMod val="60000"/>
-                    <a:lumOff val="40000"/>
-                  </a:schemeClr>
-                </a:solidFill>
-                <a:effectLst/>
-                <a:latin typeface="Trebuchet MS" panose="020B0603020202020204" pitchFamily="34" charset="0"/>
-              </a:rPr>
-              <a:t> </a:t>
-            </a:r>
-            <a:r>
-              <a:rPr lang="ro-RO" sz="1800" b="0" i="0" dirty="0" err="1">
-                <a:solidFill>
-                  <a:schemeClr val="tx2">
-                    <a:lumMod val="60000"/>
-                    <a:lumOff val="40000"/>
-                  </a:schemeClr>
-                </a:solidFill>
-                <a:effectLst/>
-                <a:latin typeface="Trebuchet MS" panose="020B0603020202020204" pitchFamily="34" charset="0"/>
-              </a:rPr>
-              <a:t>useful</a:t>
-            </a:r>
-            <a:r>
-              <a:rPr lang="ro-RO" sz="1800" b="0" i="0" dirty="0">
-                <a:solidFill>
-                  <a:schemeClr val="tx2">
-                    <a:lumMod val="60000"/>
-                    <a:lumOff val="40000"/>
-                  </a:schemeClr>
-                </a:solidFill>
-                <a:effectLst/>
-                <a:latin typeface="Trebuchet MS" panose="020B0603020202020204" pitchFamily="34" charset="0"/>
-              </a:rPr>
-              <a:t> ]</a:t>
-            </a:r>
-            <a:endParaRPr lang="ro-RO" sz="1800" b="0" i="0" dirty="0">
-              <a:solidFill>
-                <a:srgbClr val="000000"/>
-              </a:solidFill>
-              <a:effectLst/>
-              <a:latin typeface="Trebuchet MS" panose="020B0603020202020204" pitchFamily="34" charset="0"/>
-            </a:endParaRPr>
-          </a:p>
-        </p:txBody>
-      </p:sp>
     </p:spTree>
     <p:extLst>
       <p:ext uri="{BB962C8B-B14F-4D97-AF65-F5344CB8AC3E}">
@@ -7728,7 +7808,7 @@
             </a:r>
           </a:p>
           <a:p>
-            <a:pPr marL="0" lvl="0" indent="0">
+            <a:pPr marL="0" lvl="0" indent="0" algn="r">
               <a:buNone/>
             </a:pPr>
             <a:r>
@@ -7777,127 +7857,6 @@
           </a:prstGeom>
         </p:spPr>
       </p:pic>
-      <p:sp>
-        <p:nvSpPr>
-          <p:cNvPr id="4" name="TextBox 3">
-            <a:extLst>
-              <a:ext uri="{FF2B5EF4-FFF2-40B4-BE49-F238E27FC236}">
-                <a16:creationId xmlns:a16="http://schemas.microsoft.com/office/drawing/2014/main" id="{6943A86F-C98B-46DE-B0F4-D9C98B4EB936}"/>
-              </a:ext>
-            </a:extLst>
-          </p:cNvPr>
-          <p:cNvSpPr txBox="1"/>
-          <p:nvPr/>
-        </p:nvSpPr>
-        <p:spPr>
-          <a:xfrm>
-            <a:off x="4251409" y="3226729"/>
-            <a:ext cx="5022593" cy="646331"/>
-          </a:xfrm>
-          <a:prstGeom prst="rect">
-            <a:avLst/>
-          </a:prstGeom>
-          <a:noFill/>
-        </p:spPr>
-        <p:txBody>
-          <a:bodyPr wrap="none" rtlCol="0">
-            <a:spAutoFit/>
-          </a:bodyPr>
-          <a:lstStyle/>
-          <a:p>
-            <a:pPr algn="r"/>
-            <a:r>
-              <a:rPr lang="ro-RO" sz="1800" b="0" i="0" dirty="0">
-                <a:solidFill>
-                  <a:schemeClr val="tx2">
-                    <a:lumMod val="60000"/>
-                    <a:lumOff val="40000"/>
-                  </a:schemeClr>
-                </a:solidFill>
-                <a:effectLst/>
-                <a:latin typeface="Trebuchet MS" panose="020B0603020202020204" pitchFamily="34" charset="0"/>
-              </a:rPr>
-              <a:t>[ </a:t>
-            </a:r>
-            <a:r>
-              <a:rPr lang="ro-RO" sz="1800" b="0" i="0" dirty="0" err="1">
-                <a:solidFill>
-                  <a:schemeClr val="tx2">
-                    <a:lumMod val="60000"/>
-                    <a:lumOff val="40000"/>
-                  </a:schemeClr>
-                </a:solidFill>
-                <a:effectLst/>
-                <a:latin typeface="Trebuchet MS" panose="020B0603020202020204" pitchFamily="34" charset="0"/>
-              </a:rPr>
-              <a:t>Gather</a:t>
-            </a:r>
-            <a:r>
-              <a:rPr lang="en-GB" sz="1800" b="0" i="0" dirty="0">
-                <a:solidFill>
-                  <a:schemeClr val="tx2">
-                    <a:lumMod val="60000"/>
-                    <a:lumOff val="40000"/>
-                  </a:schemeClr>
-                </a:solidFill>
-                <a:effectLst/>
-                <a:latin typeface="Trebuchet MS" panose="020B0603020202020204" pitchFamily="34" charset="0"/>
-              </a:rPr>
-              <a:t> all </a:t>
-            </a:r>
-            <a:r>
-              <a:rPr lang="ro-RO" sz="1800" b="0" i="0" dirty="0">
-                <a:solidFill>
-                  <a:schemeClr val="tx2">
-                    <a:lumMod val="60000"/>
-                    <a:lumOff val="40000"/>
-                  </a:schemeClr>
-                </a:solidFill>
-                <a:effectLst/>
-                <a:latin typeface="Trebuchet MS" panose="020B0603020202020204" pitchFamily="34" charset="0"/>
-              </a:rPr>
-              <a:t>data </a:t>
-            </a:r>
-            <a:r>
-              <a:rPr lang="en-GB" sz="1800" b="0" i="0" dirty="0">
-                <a:solidFill>
-                  <a:schemeClr val="tx2">
-                    <a:lumMod val="60000"/>
-                    <a:lumOff val="40000"/>
-                  </a:schemeClr>
-                </a:solidFill>
-                <a:effectLst/>
-                <a:latin typeface="Trebuchet MS" panose="020B0603020202020204" pitchFamily="34" charset="0"/>
-              </a:rPr>
-              <a:t>queries in a separate layer</a:t>
-            </a:r>
-            <a:r>
-              <a:rPr lang="ro-RO" sz="1800" b="0" i="0" dirty="0">
-                <a:solidFill>
-                  <a:schemeClr val="tx2">
-                    <a:lumMod val="60000"/>
-                    <a:lumOff val="40000"/>
-                  </a:schemeClr>
-                </a:solidFill>
-                <a:effectLst/>
-                <a:latin typeface="Trebuchet MS" panose="020B0603020202020204" pitchFamily="34" charset="0"/>
-              </a:rPr>
-              <a:t> ]</a:t>
-            </a:r>
-            <a:endParaRPr lang="ro-RO" sz="1800" b="0" i="0" dirty="0">
-              <a:solidFill>
-                <a:srgbClr val="000000"/>
-              </a:solidFill>
-              <a:effectLst/>
-              <a:latin typeface="Trebuchet MS" panose="020B0603020202020204" pitchFamily="34" charset="0"/>
-            </a:endParaRPr>
-          </a:p>
-          <a:p>
-            <a:pPr algn="r"/>
-            <a:endParaRPr lang="en-GB" dirty="0"/>
-          </a:p>
-        </p:txBody>
-      </p:sp>
     </p:spTree>
     <p:extLst>
       <p:ext uri="{BB962C8B-B14F-4D97-AF65-F5344CB8AC3E}">
@@ -8043,7 +8002,7 @@
         </p:blipFill>
         <p:spPr>
           <a:xfrm>
-            <a:off x="970405" y="4021327"/>
+            <a:off x="970405" y="4632747"/>
             <a:ext cx="8010525" cy="771525"/>
           </a:xfrm>
           <a:prstGeom prst="rect">
@@ -8575,10 +8534,10 @@
       </p:sp>
       <p:pic>
         <p:nvPicPr>
-          <p:cNvPr id="12" name="Picture 11" descr="Diagram&#10;&#10;Description automatically generated">
+          <p:cNvPr id="5" name="Picture 4" descr="Diagram&#10;&#10;Description automatically generated with medium confidence">
             <a:extLst>
               <a:ext uri="{FF2B5EF4-FFF2-40B4-BE49-F238E27FC236}">
-                <a16:creationId xmlns:a16="http://schemas.microsoft.com/office/drawing/2014/main" id="{573618E1-98F8-4D5A-8A12-A564F7678D7B}"/>
+                <a16:creationId xmlns:a16="http://schemas.microsoft.com/office/drawing/2014/main" id="{295E5FD7-BCF3-466A-9629-67E5615A2134}"/>
               </a:ext>
             </a:extLst>
           </p:cNvPr>
@@ -8595,7 +8554,7 @@
         </p:blipFill>
         <p:spPr>
           <a:xfrm>
-            <a:off x="677334" y="2986314"/>
+            <a:off x="677334" y="2983837"/>
             <a:ext cx="8772525" cy="3057525"/>
           </a:xfrm>
           <a:prstGeom prst="rect">
@@ -8655,16 +8614,8 @@
           <a:lstStyle/>
           <a:p>
             <a:r>
-              <a:rPr lang="ro-RO" dirty="0" err="1"/>
-              <a:t>Architecture</a:t>
-            </a:r>
-            <a:r>
-              <a:rPr lang="ro-RO" dirty="0"/>
-              <a:t> </a:t>
-            </a:r>
-            <a:r>
-              <a:rPr lang="ro-RO" dirty="0" err="1"/>
-              <a:t>Diagram</a:t>
+              <a:rPr lang="ro-RO"/>
+              <a:t>Demo (Architecture Diagram)</a:t>
             </a:r>
             <a:endParaRPr lang="en-GB" dirty="0"/>
           </a:p>
@@ -8672,19 +8623,17 @@
       </p:sp>
       <p:pic>
         <p:nvPicPr>
-          <p:cNvPr id="5" name="Content Placeholder 4" descr="Graphical user interface, website&#10;&#10;Description automatically generated">
+          <p:cNvPr id="4" name="Picture 3">
             <a:extLst>
               <a:ext uri="{FF2B5EF4-FFF2-40B4-BE49-F238E27FC236}">
-                <a16:creationId xmlns:a16="http://schemas.microsoft.com/office/drawing/2014/main" id="{AAA60C13-1BC5-4250-A444-29FC6E39FF50}"/>
+                <a16:creationId xmlns:a16="http://schemas.microsoft.com/office/drawing/2014/main" id="{C600872F-EF08-4E7F-A96D-8DA7CFCFC0EE}"/>
               </a:ext>
             </a:extLst>
           </p:cNvPr>
           <p:cNvPicPr>
-            <a:picLocks noGrp="1" noChangeAspect="1"/>
+            <a:picLocks noChangeAspect="1"/>
           </p:cNvPicPr>
-          <p:nvPr>
-            <p:ph idx="1"/>
-          </p:nvPr>
+          <p:nvPr/>
         </p:nvPicPr>
         <p:blipFill>
           <a:blip r:embed="rId2"/>
@@ -8694,9 +8643,12 @@
         </p:blipFill>
         <p:spPr>
           <a:xfrm>
-            <a:off x="1296077" y="2160588"/>
-            <a:ext cx="7359883" cy="3881437"/>
+            <a:off x="736058" y="1634232"/>
+            <a:ext cx="7854270" cy="4410071"/>
           </a:xfrm>
+          <a:prstGeom prst="rect">
+            <a:avLst/>
+          </a:prstGeom>
         </p:spPr>
       </p:pic>
     </p:spTree>
@@ -8731,10 +8683,10 @@
       </p:grpSpPr>
       <p:pic>
         <p:nvPicPr>
-          <p:cNvPr id="4" name="Picture 3">
+          <p:cNvPr id="6" name="Picture 5">
             <a:extLst>
               <a:ext uri="{FF2B5EF4-FFF2-40B4-BE49-F238E27FC236}">
-                <a16:creationId xmlns:a16="http://schemas.microsoft.com/office/drawing/2014/main" id="{A3541DD2-B30D-4CF3-BC24-53F3CE432425}"/>
+                <a16:creationId xmlns:a16="http://schemas.microsoft.com/office/drawing/2014/main" id="{847D741D-EED7-4A43-99BE-3C9B9D3B49C6}"/>
               </a:ext>
             </a:extLst>
           </p:cNvPr>
@@ -8751,12 +8703,22 @@
         </p:blipFill>
         <p:spPr>
           <a:xfrm>
-            <a:off x="1139247" y="1682344"/>
-            <a:ext cx="6449192" cy="3493312"/>
+            <a:off x="677334" y="1501920"/>
+            <a:ext cx="6449192" cy="3854160"/>
           </a:xfrm>
           <a:prstGeom prst="rect">
             <a:avLst/>
           </a:prstGeom>
+          <a:ln>
+            <a:noFill/>
+          </a:ln>
+          <a:effectLst>
+            <a:outerShdw blurRad="292100" dist="139700" dir="2700000" algn="tl" rotWithShape="0">
+              <a:srgbClr val="333333">
+                <a:alpha val="65000"/>
+              </a:srgbClr>
+            </a:outerShdw>
+          </a:effectLst>
         </p:spPr>
       </p:pic>
       <p:sp>
@@ -8783,6 +8745,10 @@
             <a:r>
               <a:rPr lang="ro-RO" dirty="0" err="1"/>
               <a:t>Demo</a:t>
+            </a:r>
+            <a:r>
+              <a:rPr lang="ro-RO" dirty="0"/>
+              <a:t> (The Code)</a:t>
             </a:r>
             <a:endParaRPr lang="en-GB" dirty="0"/>
           </a:p>
@@ -8810,12 +8776,22 @@
         </p:blipFill>
         <p:spPr>
           <a:xfrm>
-            <a:off x="2719952" y="2621700"/>
+            <a:off x="3370401" y="2602847"/>
             <a:ext cx="6377940" cy="3493312"/>
           </a:xfrm>
           <a:prstGeom prst="rect">
             <a:avLst/>
           </a:prstGeom>
+          <a:ln>
+            <a:noFill/>
+          </a:ln>
+          <a:effectLst>
+            <a:outerShdw blurRad="292100" dist="139700" dir="2700000" algn="tl" rotWithShape="0">
+              <a:srgbClr val="333333">
+                <a:alpha val="65000"/>
+              </a:srgbClr>
+            </a:outerShdw>
+          </a:effectLst>
         </p:spPr>
       </p:pic>
     </p:spTree>

</xml_diff>